<commit_message>
almost done. remaining: add figures review some paragraphs
</commit_message>
<xml_diff>
--- a/dissertation/gfx/charts/Block Diagram.pptx
+++ b/dissertation/gfx/charts/Block Diagram.pptx
@@ -288,7 +288,8 @@
           <a:p>
             <a:fld id="{E6211E31-3886-4096-B94F-3B7731178AD5}" type="datetimeFigureOut">
               <a:rPr lang="en-US" smtClean="0"/>
-              <a:t>7/12/2008</a:t>
+              <a:pPr/>
+              <a:t>7/20/2008</a:t>
             </a:fld>
             <a:endParaRPr lang="en-US"/>
           </a:p>
@@ -330,6 +331,7 @@
           <a:p>
             <a:fld id="{D95F50C0-3C92-40FA-8919-5D756E1B1C2C}" type="slidenum">
               <a:rPr lang="en-US" smtClean="0"/>
+              <a:pPr/>
               <a:t>‹#›</a:t>
             </a:fld>
             <a:endParaRPr lang="en-US"/>
@@ -453,7 +455,8 @@
           <a:p>
             <a:fld id="{E6211E31-3886-4096-B94F-3B7731178AD5}" type="datetimeFigureOut">
               <a:rPr lang="en-US" smtClean="0"/>
-              <a:t>7/12/2008</a:t>
+              <a:pPr/>
+              <a:t>7/20/2008</a:t>
             </a:fld>
             <a:endParaRPr lang="en-US"/>
           </a:p>
@@ -495,6 +498,7 @@
           <a:p>
             <a:fld id="{D95F50C0-3C92-40FA-8919-5D756E1B1C2C}" type="slidenum">
               <a:rPr lang="en-US" smtClean="0"/>
+              <a:pPr/>
               <a:t>‹#›</a:t>
             </a:fld>
             <a:endParaRPr lang="en-US"/>
@@ -628,7 +632,8 @@
           <a:p>
             <a:fld id="{E6211E31-3886-4096-B94F-3B7731178AD5}" type="datetimeFigureOut">
               <a:rPr lang="en-US" smtClean="0"/>
-              <a:t>7/12/2008</a:t>
+              <a:pPr/>
+              <a:t>7/20/2008</a:t>
             </a:fld>
             <a:endParaRPr lang="en-US"/>
           </a:p>
@@ -670,6 +675,7 @@
           <a:p>
             <a:fld id="{D95F50C0-3C92-40FA-8919-5D756E1B1C2C}" type="slidenum">
               <a:rPr lang="en-US" smtClean="0"/>
+              <a:pPr/>
               <a:t>‹#›</a:t>
             </a:fld>
             <a:endParaRPr lang="en-US"/>
@@ -793,7 +799,8 @@
           <a:p>
             <a:fld id="{E6211E31-3886-4096-B94F-3B7731178AD5}" type="datetimeFigureOut">
               <a:rPr lang="en-US" smtClean="0"/>
-              <a:t>7/12/2008</a:t>
+              <a:pPr/>
+              <a:t>7/20/2008</a:t>
             </a:fld>
             <a:endParaRPr lang="en-US"/>
           </a:p>
@@ -835,6 +842,7 @@
           <a:p>
             <a:fld id="{D95F50C0-3C92-40FA-8919-5D756E1B1C2C}" type="slidenum">
               <a:rPr lang="en-US" smtClean="0"/>
+              <a:pPr/>
               <a:t>‹#›</a:t>
             </a:fld>
             <a:endParaRPr lang="en-US"/>
@@ -1034,7 +1042,8 @@
           <a:p>
             <a:fld id="{E6211E31-3886-4096-B94F-3B7731178AD5}" type="datetimeFigureOut">
               <a:rPr lang="en-US" smtClean="0"/>
-              <a:t>7/12/2008</a:t>
+              <a:pPr/>
+              <a:t>7/20/2008</a:t>
             </a:fld>
             <a:endParaRPr lang="en-US"/>
           </a:p>
@@ -1076,6 +1085,7 @@
           <a:p>
             <a:fld id="{D95F50C0-3C92-40FA-8919-5D756E1B1C2C}" type="slidenum">
               <a:rPr lang="en-US" smtClean="0"/>
+              <a:pPr/>
               <a:t>‹#›</a:t>
             </a:fld>
             <a:endParaRPr lang="en-US"/>
@@ -1317,7 +1327,8 @@
           <a:p>
             <a:fld id="{E6211E31-3886-4096-B94F-3B7731178AD5}" type="datetimeFigureOut">
               <a:rPr lang="en-US" smtClean="0"/>
-              <a:t>7/12/2008</a:t>
+              <a:pPr/>
+              <a:t>7/20/2008</a:t>
             </a:fld>
             <a:endParaRPr lang="en-US"/>
           </a:p>
@@ -1359,6 +1370,7 @@
           <a:p>
             <a:fld id="{D95F50C0-3C92-40FA-8919-5D756E1B1C2C}" type="slidenum">
               <a:rPr lang="en-US" smtClean="0"/>
+              <a:pPr/>
               <a:t>‹#›</a:t>
             </a:fld>
             <a:endParaRPr lang="en-US"/>
@@ -1739,7 +1751,8 @@
           <a:p>
             <a:fld id="{E6211E31-3886-4096-B94F-3B7731178AD5}" type="datetimeFigureOut">
               <a:rPr lang="en-US" smtClean="0"/>
-              <a:t>7/12/2008</a:t>
+              <a:pPr/>
+              <a:t>7/20/2008</a:t>
             </a:fld>
             <a:endParaRPr lang="en-US"/>
           </a:p>
@@ -1781,6 +1794,7 @@
           <a:p>
             <a:fld id="{D95F50C0-3C92-40FA-8919-5D756E1B1C2C}" type="slidenum">
               <a:rPr lang="en-US" smtClean="0"/>
+              <a:pPr/>
               <a:t>‹#›</a:t>
             </a:fld>
             <a:endParaRPr lang="en-US"/>
@@ -1852,7 +1866,8 @@
           <a:p>
             <a:fld id="{E6211E31-3886-4096-B94F-3B7731178AD5}" type="datetimeFigureOut">
               <a:rPr lang="en-US" smtClean="0"/>
-              <a:t>7/12/2008</a:t>
+              <a:pPr/>
+              <a:t>7/20/2008</a:t>
             </a:fld>
             <a:endParaRPr lang="en-US"/>
           </a:p>
@@ -1894,6 +1909,7 @@
           <a:p>
             <a:fld id="{D95F50C0-3C92-40FA-8919-5D756E1B1C2C}" type="slidenum">
               <a:rPr lang="en-US" smtClean="0"/>
+              <a:pPr/>
               <a:t>‹#›</a:t>
             </a:fld>
             <a:endParaRPr lang="en-US"/>
@@ -1942,7 +1958,8 @@
           <a:p>
             <a:fld id="{E6211E31-3886-4096-B94F-3B7731178AD5}" type="datetimeFigureOut">
               <a:rPr lang="en-US" smtClean="0"/>
-              <a:t>7/12/2008</a:t>
+              <a:pPr/>
+              <a:t>7/20/2008</a:t>
             </a:fld>
             <a:endParaRPr lang="en-US"/>
           </a:p>
@@ -1984,6 +2001,7 @@
           <a:p>
             <a:fld id="{D95F50C0-3C92-40FA-8919-5D756E1B1C2C}" type="slidenum">
               <a:rPr lang="en-US" smtClean="0"/>
+              <a:pPr/>
               <a:t>‹#›</a:t>
             </a:fld>
             <a:endParaRPr lang="en-US"/>
@@ -2214,7 +2232,8 @@
           <a:p>
             <a:fld id="{E6211E31-3886-4096-B94F-3B7731178AD5}" type="datetimeFigureOut">
               <a:rPr lang="en-US" smtClean="0"/>
-              <a:t>7/12/2008</a:t>
+              <a:pPr/>
+              <a:t>7/20/2008</a:t>
             </a:fld>
             <a:endParaRPr lang="en-US"/>
           </a:p>
@@ -2256,6 +2275,7 @@
           <a:p>
             <a:fld id="{D95F50C0-3C92-40FA-8919-5D756E1B1C2C}" type="slidenum">
               <a:rPr lang="en-US" smtClean="0"/>
+              <a:pPr/>
               <a:t>‹#›</a:t>
             </a:fld>
             <a:endParaRPr lang="en-US"/>
@@ -2462,7 +2482,8 @@
           <a:p>
             <a:fld id="{E6211E31-3886-4096-B94F-3B7731178AD5}" type="datetimeFigureOut">
               <a:rPr lang="en-US" smtClean="0"/>
-              <a:t>7/12/2008</a:t>
+              <a:pPr/>
+              <a:t>7/20/2008</a:t>
             </a:fld>
             <a:endParaRPr lang="en-US"/>
           </a:p>
@@ -2504,6 +2525,7 @@
           <a:p>
             <a:fld id="{D95F50C0-3C92-40FA-8919-5D756E1B1C2C}" type="slidenum">
               <a:rPr lang="en-US" smtClean="0"/>
+              <a:pPr/>
               <a:t>‹#›</a:t>
             </a:fld>
             <a:endParaRPr lang="en-US"/>
@@ -2670,7 +2692,8 @@
           <a:p>
             <a:fld id="{E6211E31-3886-4096-B94F-3B7731178AD5}" type="datetimeFigureOut">
               <a:rPr lang="en-US" smtClean="0"/>
-              <a:t>7/12/2008</a:t>
+              <a:pPr/>
+              <a:t>7/20/2008</a:t>
             </a:fld>
             <a:endParaRPr lang="en-US"/>
           </a:p>
@@ -2748,6 +2771,7 @@
           <a:p>
             <a:fld id="{D95F50C0-3C92-40FA-8919-5D756E1B1C2C}" type="slidenum">
               <a:rPr lang="en-US" smtClean="0"/>
+              <a:pPr/>
               <a:t>‹#›</a:t>
             </a:fld>
             <a:endParaRPr lang="en-US"/>
@@ -3077,7 +3101,15 @@
           <a:lstStyle/>
           <a:p>
             <a:pPr algn="ctr"/>
-            <a:endParaRPr lang="en-US">
+            <a:r>
+              <a:rPr lang="pt-PT" sz="1000" dirty="0" smtClean="0">
+                <a:solidFill>
+                  <a:schemeClr val="dk1"/>
+                </a:solidFill>
+              </a:rPr>
+              <a:t>intranet</a:t>
+            </a:r>
+            <a:endParaRPr lang="en-US" sz="1000" dirty="0">
               <a:solidFill>
                 <a:schemeClr val="dk1"/>
               </a:solidFill>
@@ -3792,50 +3824,6 @@
           </a:fontRef>
         </p:style>
       </p:cxnSp>
-      <p:sp>
-        <p:nvSpPr>
-          <p:cNvPr id="9" name="Down Arrow 8"/>
-          <p:cNvSpPr/>
-          <p:nvPr/>
-        </p:nvSpPr>
-        <p:spPr>
-          <a:xfrm rot="10800000">
-            <a:off x="3714753" y="2935939"/>
-            <a:ext cx="360364" cy="497314"/>
-          </a:xfrm>
-          <a:prstGeom prst="downArrow">
-            <a:avLst>
-              <a:gd name="adj1" fmla="val 48425"/>
-              <a:gd name="adj2" fmla="val 50000"/>
-            </a:avLst>
-          </a:prstGeom>
-          <a:ln>
-            <a:noFill/>
-          </a:ln>
-        </p:spPr>
-        <p:style>
-          <a:lnRef idx="1">
-            <a:schemeClr val="accent1"/>
-          </a:lnRef>
-          <a:fillRef idx="2">
-            <a:schemeClr val="accent1"/>
-          </a:fillRef>
-          <a:effectRef idx="1">
-            <a:schemeClr val="accent1"/>
-          </a:effectRef>
-          <a:fontRef idx="minor">
-            <a:schemeClr val="dk1"/>
-          </a:fontRef>
-        </p:style>
-        <p:txBody>
-          <a:bodyPr lIns="91416" tIns="45708" rIns="91416" bIns="45708" rtlCol="0" anchor="ctr"/>
-          <a:lstStyle/>
-          <a:p>
-            <a:pPr algn="ctr"/>
-            <a:endParaRPr lang="en-US"/>
-          </a:p>
-        </p:txBody>
-      </p:sp>
       <p:sp>
         <p:nvSpPr>
           <p:cNvPr id="56" name="Down Arrow 55"/>
@@ -4068,7 +4056,11 @@
             <a:pPr algn="ctr"/>
             <a:r>
               <a:rPr lang="pt-PT" sz="700" dirty="0" smtClean="0"/>
-              <a:t>Laser detection module by Ricardo jota</a:t>
+              <a:t>Laser detection </a:t>
+            </a:r>
+            <a:r>
+              <a:rPr lang="pt-PT" sz="700" dirty="0" smtClean="0"/>
+              <a:t>module</a:t>
             </a:r>
             <a:endParaRPr lang="en-US" sz="700" dirty="0"/>
           </a:p>

</xml_diff>